<commit_message>
Updated slides for tomorrow
</commit_message>
<xml_diff>
--- a/Presentaton slide/HIT3061 SOFTWARE TEAM PROJECT.pptx
+++ b/Presentaton slide/HIT3061 SOFTWARE TEAM PROJECT.pptx
@@ -17,19 +17,6 @@
   </p:sldIdLst>
   <p:sldSz cx="9144000" cy="6858000" type="screen4x3"/>
   <p:notesSz cx="6858000" cy="9144000"/>
-  <p:embeddedFontLst>
-    <p:embeddedFont>
-      <p:font typeface="宋体" pitchFamily="2" charset="-122"/>
-      <p:regular r:id="rId9"/>
-    </p:embeddedFont>
-    <p:embeddedFont>
-      <p:font typeface="Calibri" pitchFamily="34" charset="0"/>
-      <p:regular r:id="rId10"/>
-      <p:bold r:id="rId11"/>
-      <p:italic r:id="rId12"/>
-      <p:boldItalic r:id="rId13"/>
-    </p:embeddedFont>
-  </p:embeddedFontLst>
   <p:defaultTextStyle>
     <a:defPPr>
       <a:defRPr lang="zh-CN"/>
@@ -211,7 +198,7 @@
             <a:fld id="{4BDC485C-C49A-4366-A320-D4D420BCC7DA}" type="datetimeFigureOut">
               <a:rPr lang="en-AU" smtClean="0"/>
               <a:pPr/>
-              <a:t>5/09/2013</a:t>
+              <a:t>9/09/13</a:t>
             </a:fld>
             <a:endParaRPr lang="en-AU"/>
           </a:p>
@@ -662,7 +649,7 @@
             <a:fld id="{CF629A08-2B0F-4620-BF31-E09740D255D1}" type="datetimeFigureOut">
               <a:rPr lang="zh-CN" altLang="en-US" smtClean="0"/>
               <a:pPr/>
-              <a:t>2013/9/5</a:t>
+              <a:t>9/09/13</a:t>
             </a:fld>
             <a:endParaRPr lang="zh-CN" altLang="en-US"/>
           </a:p>
@@ -834,7 +821,7 @@
             <a:fld id="{CF629A08-2B0F-4620-BF31-E09740D255D1}" type="datetimeFigureOut">
               <a:rPr lang="zh-CN" altLang="en-US" smtClean="0"/>
               <a:pPr/>
-              <a:t>2013/9/5</a:t>
+              <a:t>9/09/13</a:t>
             </a:fld>
             <a:endParaRPr lang="zh-CN" altLang="en-US"/>
           </a:p>
@@ -1016,7 +1003,7 @@
             <a:fld id="{CF629A08-2B0F-4620-BF31-E09740D255D1}" type="datetimeFigureOut">
               <a:rPr lang="zh-CN" altLang="en-US" smtClean="0"/>
               <a:pPr/>
-              <a:t>2013/9/5</a:t>
+              <a:t>9/09/13</a:t>
             </a:fld>
             <a:endParaRPr lang="zh-CN" altLang="en-US"/>
           </a:p>
@@ -1188,7 +1175,7 @@
             <a:fld id="{CF629A08-2B0F-4620-BF31-E09740D255D1}" type="datetimeFigureOut">
               <a:rPr lang="zh-CN" altLang="en-US" smtClean="0"/>
               <a:pPr/>
-              <a:t>2013/9/5</a:t>
+              <a:t>9/09/13</a:t>
             </a:fld>
             <a:endParaRPr lang="zh-CN" altLang="en-US"/>
           </a:p>
@@ -1436,7 +1423,7 @@
             <a:fld id="{CF629A08-2B0F-4620-BF31-E09740D255D1}" type="datetimeFigureOut">
               <a:rPr lang="zh-CN" altLang="en-US" smtClean="0"/>
               <a:pPr/>
-              <a:t>2013/9/5</a:t>
+              <a:t>9/09/13</a:t>
             </a:fld>
             <a:endParaRPr lang="zh-CN" altLang="en-US"/>
           </a:p>
@@ -1726,7 +1713,7 @@
             <a:fld id="{CF629A08-2B0F-4620-BF31-E09740D255D1}" type="datetimeFigureOut">
               <a:rPr lang="zh-CN" altLang="en-US" smtClean="0"/>
               <a:pPr/>
-              <a:t>2013/9/5</a:t>
+              <a:t>9/09/13</a:t>
             </a:fld>
             <a:endParaRPr lang="zh-CN" altLang="en-US"/>
           </a:p>
@@ -2150,7 +2137,7 @@
             <a:fld id="{CF629A08-2B0F-4620-BF31-E09740D255D1}" type="datetimeFigureOut">
               <a:rPr lang="zh-CN" altLang="en-US" smtClean="0"/>
               <a:pPr/>
-              <a:t>2013/9/5</a:t>
+              <a:t>9/09/13</a:t>
             </a:fld>
             <a:endParaRPr lang="zh-CN" altLang="en-US"/>
           </a:p>
@@ -2270,7 +2257,7 @@
             <a:fld id="{CF629A08-2B0F-4620-BF31-E09740D255D1}" type="datetimeFigureOut">
               <a:rPr lang="zh-CN" altLang="en-US" smtClean="0"/>
               <a:pPr/>
-              <a:t>2013/9/5</a:t>
+              <a:t>9/09/13</a:t>
             </a:fld>
             <a:endParaRPr lang="zh-CN" altLang="en-US"/>
           </a:p>
@@ -2367,7 +2354,7 @@
             <a:fld id="{CF629A08-2B0F-4620-BF31-E09740D255D1}" type="datetimeFigureOut">
               <a:rPr lang="zh-CN" altLang="en-US" smtClean="0"/>
               <a:pPr/>
-              <a:t>2013/9/5</a:t>
+              <a:t>9/09/13</a:t>
             </a:fld>
             <a:endParaRPr lang="zh-CN" altLang="en-US"/>
           </a:p>
@@ -2646,7 +2633,7 @@
             <a:fld id="{CF629A08-2B0F-4620-BF31-E09740D255D1}" type="datetimeFigureOut">
               <a:rPr lang="zh-CN" altLang="en-US" smtClean="0"/>
               <a:pPr/>
-              <a:t>2013/9/5</a:t>
+              <a:t>9/09/13</a:t>
             </a:fld>
             <a:endParaRPr lang="zh-CN" altLang="en-US"/>
           </a:p>
@@ -2905,7 +2892,7 @@
             <a:fld id="{CF629A08-2B0F-4620-BF31-E09740D255D1}" type="datetimeFigureOut">
               <a:rPr lang="zh-CN" altLang="en-US" smtClean="0"/>
               <a:pPr/>
-              <a:t>2013/9/5</a:t>
+              <a:t>9/09/13</a:t>
             </a:fld>
             <a:endParaRPr lang="zh-CN" altLang="en-US"/>
           </a:p>
@@ -3123,7 +3110,7 @@
             <a:fld id="{CF629A08-2B0F-4620-BF31-E09740D255D1}" type="datetimeFigureOut">
               <a:rPr lang="zh-CN" altLang="en-US" smtClean="0"/>
               <a:pPr/>
-              <a:t>2013/9/5</a:t>
+              <a:t>9/09/13</a:t>
             </a:fld>
             <a:endParaRPr lang="zh-CN" altLang="en-US"/>
           </a:p>
@@ -3523,14 +3510,14 @@
         <p:spPr bwMode="auto">
           <a:xfrm>
             <a:off x="0" y="0"/>
-            <a:ext cx="9144000" cy="5579269"/>
+            <a:ext cx="9144000" cy="6858000"/>
           </a:xfrm>
           <a:prstGeom prst="rect">
             <a:avLst/>
           </a:prstGeom>
           <a:noFill/>
           <a:extLst>
-            <a:ext uri="{909E8E84-426E-40DD-AFC4-6F175D3DCCD1}">
+            <a:ext uri="{909E8E84-426E-40dd-AFC4-6F175D3DCCD1}">
               <a14:hiddenFill xmlns:a14="http://schemas.microsoft.com/office/drawing/2010/main">
                 <a:solidFill>
                   <a:srgbClr val="FFFFFF"/>
@@ -3563,14 +3550,12 @@
           <a:lstStyle/>
           <a:p>
             <a:r>
-              <a:rPr lang="en-US" sz="6000" b="1" dirty="0" smtClean="0">
+              <a:rPr lang="en-US" sz="5400" b="1" dirty="0" smtClean="0">
                 <a:ln w="0">
                   <a:noFill/>
                 </a:ln>
                 <a:solidFill>
-                  <a:schemeClr val="bg1">
-                    <a:alpha val="82000"/>
-                  </a:schemeClr>
+                  <a:srgbClr val="FFFFFF"/>
                 </a:solidFill>
                 <a:effectLst>
                   <a:outerShdw blurRad="38100" sx="102000" sy="102000" algn="ctr" rotWithShape="0">
@@ -3579,36 +3564,37 @@
                     </a:prstClr>
                   </a:outerShdw>
                 </a:effectLst>
-                <a:latin typeface="Komika Parch" pitchFamily="2" charset="0"/>
+                <a:latin typeface="+mn-lt"/>
                 <a:ea typeface="+mn-ea"/>
                 <a:cs typeface="+mn-cs"/>
               </a:rPr>
               <a:t>HIT3016</a:t>
             </a:r>
             <a:r>
-              <a:rPr lang="en-US" sz="6000" b="1" dirty="0" smtClean="0">
-                <a:solidFill>
-                  <a:schemeClr val="bg1"/>
-                </a:solidFill>
+              <a:rPr lang="en-US" sz="5400" b="1" dirty="0" smtClean="0">
+                <a:solidFill>
+                  <a:srgbClr val="FFFFFF"/>
+                </a:solidFill>
+                <a:latin typeface="+mn-lt"/>
               </a:rPr>
               <a:t> </a:t>
             </a:r>
-            <a:br>
-              <a:rPr lang="en-US" sz="6000" b="1" dirty="0" smtClean="0">
-                <a:solidFill>
-                  <a:schemeClr val="bg1"/>
-                </a:solidFill>
+            <a:r>
+              <a:rPr lang="en-US" sz="5400" b="1" dirty="0" smtClean="0">
+                <a:solidFill>
+                  <a:srgbClr val="FFFFFF"/>
+                </a:solidFill>
+                <a:latin typeface="+mn-lt"/>
               </a:rPr>
-            </a:br>
-            <a:r>
-              <a:rPr lang="en-US" sz="6000" b="1" dirty="0" smtClean="0">
+              <a:t> - </a:t>
+            </a:r>
+            <a:r>
+              <a:rPr lang="en-US" sz="5400" b="1" dirty="0" smtClean="0">
                 <a:ln w="0">
                   <a:noFill/>
                 </a:ln>
                 <a:solidFill>
-                  <a:schemeClr val="bg1">
-                    <a:alpha val="82000"/>
-                  </a:schemeClr>
+                  <a:srgbClr val="FFFFFF"/>
                 </a:solidFill>
                 <a:effectLst>
                   <a:outerShdw blurRad="38100" sx="102000" sy="102000" algn="ctr" rotWithShape="0">
@@ -3617,20 +3603,60 @@
                     </a:prstClr>
                   </a:outerShdw>
                 </a:effectLst>
-                <a:latin typeface="Komika Parch" pitchFamily="2" charset="0"/>
+                <a:latin typeface="+mn-lt"/>
                 <a:ea typeface="+mn-ea"/>
                 <a:cs typeface="+mn-cs"/>
               </a:rPr>
-              <a:t>SOFTWARE TEAM PROJECT</a:t>
-            </a:r>
-            <a:endParaRPr lang="en-US" sz="6000" b="1" dirty="0">
+              <a:t>SOFTWARE </a:t>
+            </a:r>
+            <a:r>
+              <a:rPr lang="en-US" sz="5400" b="1" dirty="0" smtClean="0">
+                <a:ln w="0">
+                  <a:noFill/>
+                </a:ln>
+                <a:solidFill>
+                  <a:srgbClr val="FFFFFF"/>
+                </a:solidFill>
+                <a:effectLst>
+                  <a:outerShdw blurRad="38100" sx="102000" sy="102000" algn="ctr" rotWithShape="0">
+                    <a:prstClr val="black">
+                      <a:alpha val="65000"/>
+                    </a:prstClr>
+                  </a:outerShdw>
+                </a:effectLst>
+                <a:latin typeface="+mn-lt"/>
+                <a:ea typeface="+mn-ea"/>
+                <a:cs typeface="+mn-cs"/>
+              </a:rPr>
+              <a:t>TEAM </a:t>
+            </a:r>
+            <a:r>
+              <a:rPr lang="en-US" sz="5400" b="1" dirty="0" smtClean="0">
+                <a:ln w="0">
+                  <a:noFill/>
+                </a:ln>
+                <a:solidFill>
+                  <a:srgbClr val="FFFFFF"/>
+                </a:solidFill>
+                <a:effectLst>
+                  <a:outerShdw blurRad="38100" sx="102000" sy="102000" algn="ctr" rotWithShape="0">
+                    <a:prstClr val="black">
+                      <a:alpha val="65000"/>
+                    </a:prstClr>
+                  </a:outerShdw>
+                </a:effectLst>
+                <a:latin typeface="+mn-lt"/>
+                <a:ea typeface="+mn-ea"/>
+                <a:cs typeface="+mn-cs"/>
+              </a:rPr>
+              <a:t>PROJECT</a:t>
+            </a:r>
+            <a:endParaRPr lang="en-US" sz="5400" b="1" dirty="0">
               <a:ln w="0">
                 <a:noFill/>
               </a:ln>
               <a:solidFill>
-                <a:schemeClr val="bg1">
-                  <a:alpha val="82000"/>
-                </a:schemeClr>
+                <a:srgbClr val="FFFFFF"/>
               </a:solidFill>
               <a:effectLst>
                 <a:outerShdw blurRad="38100" sx="102000" sy="102000" algn="ctr" rotWithShape="0">
@@ -3639,7 +3665,7 @@
                   </a:prstClr>
                 </a:outerShdw>
               </a:effectLst>
-              <a:latin typeface="Komika Parch" pitchFamily="2" charset="0"/>
+              <a:latin typeface="+mn-lt"/>
               <a:ea typeface="+mn-ea"/>
               <a:cs typeface="+mn-cs"/>
             </a:endParaRPr>
@@ -3670,43 +3696,71 @@
           <a:p>
             <a:pPr algn="l"/>
             <a:r>
-              <a:rPr lang="en-US" altLang="zh-CN" sz="2800" dirty="0"/>
+              <a:rPr lang="en-US" altLang="zh-CN" sz="2800" dirty="0">
+                <a:solidFill>
+                  <a:srgbClr val="FFFFFF"/>
+                </a:solidFill>
+              </a:rPr>
               <a:t>		Daniel CORSALETTI</a:t>
             </a:r>
           </a:p>
           <a:p>
             <a:pPr algn="l"/>
             <a:r>
-              <a:rPr lang="en-US" altLang="zh-CN" sz="2800" dirty="0"/>
+              <a:rPr lang="en-US" altLang="zh-CN" sz="2800" dirty="0">
+                <a:solidFill>
+                  <a:srgbClr val="FFFFFF"/>
+                </a:solidFill>
+              </a:rPr>
               <a:t>	</a:t>
             </a:r>
             <a:r>
-              <a:rPr lang="en-US" altLang="zh-CN" sz="2800" dirty="0" smtClean="0"/>
+              <a:rPr lang="en-US" altLang="zh-CN" sz="2800" dirty="0" smtClean="0">
+                <a:solidFill>
+                  <a:srgbClr val="FFFFFF"/>
+                </a:solidFill>
+              </a:rPr>
               <a:t>	Shengwei </a:t>
             </a:r>
             <a:r>
-              <a:rPr lang="en-US" altLang="zh-CN" sz="2800" dirty="0"/>
+              <a:rPr lang="en-US" altLang="zh-CN" sz="2800" dirty="0">
+                <a:solidFill>
+                  <a:srgbClr val="FFFFFF"/>
+                </a:solidFill>
+              </a:rPr>
               <a:t>LI</a:t>
             </a:r>
           </a:p>
           <a:p>
             <a:pPr algn="l"/>
             <a:r>
-              <a:rPr lang="en-US" altLang="zh-CN" sz="2800" dirty="0"/>
+              <a:rPr lang="en-US" altLang="zh-CN" sz="2800" dirty="0">
+                <a:solidFill>
+                  <a:srgbClr val="FFFFFF"/>
+                </a:solidFill>
+              </a:rPr>
               <a:t>		Minh Duc NGUYEN</a:t>
             </a:r>
           </a:p>
           <a:p>
             <a:pPr algn="l"/>
             <a:r>
-              <a:rPr lang="en-US" altLang="zh-CN" sz="2800" dirty="0"/>
+              <a:rPr lang="en-US" altLang="zh-CN" sz="2800" dirty="0">
+                <a:solidFill>
+                  <a:srgbClr val="FFFFFF"/>
+                </a:solidFill>
+              </a:rPr>
               <a:t>		Joshua STOPPER</a:t>
             </a:r>
           </a:p>
           <a:p>
             <a:pPr algn="l"/>
             <a:r>
-              <a:rPr lang="en-US" altLang="zh-CN" sz="2800" dirty="0"/>
+              <a:rPr lang="en-US" altLang="zh-CN" sz="2800" dirty="0">
+                <a:solidFill>
+                  <a:srgbClr val="FFFFFF"/>
+                </a:solidFill>
+              </a:rPr>
               <a:t>		Tran Xuong TRAN</a:t>
             </a:r>
             <a:endParaRPr lang="en-US" sz="3000" dirty="0">
@@ -3714,9 +3768,7 @@
                 <a:noFill/>
               </a:ln>
               <a:solidFill>
-                <a:schemeClr val="bg1">
-                  <a:alpha val="82000"/>
-                </a:schemeClr>
+                <a:srgbClr val="FFFFFF"/>
               </a:solidFill>
               <a:effectLst>
                 <a:outerShdw blurRad="38100" sx="102000" sy="102000" algn="ctr" rotWithShape="0">
@@ -3725,7 +3777,6 @@
                   </a:prstClr>
                 </a:outerShdw>
               </a:effectLst>
-              <a:latin typeface="Komika Parch" pitchFamily="2" charset="0"/>
             </a:endParaRPr>
           </a:p>
         </p:txBody>
@@ -3786,7 +3837,6 @@
                   </a:prstClr>
                 </a:outerShdw>
               </a:effectLst>
-              <a:latin typeface="Komika Parch" pitchFamily="2" charset="0"/>
             </a:endParaRPr>
           </a:p>
         </p:txBody>
@@ -3801,7 +3851,7 @@
         </p:nvSpPr>
         <p:spPr>
           <a:xfrm>
-            <a:off x="762000" y="1981200"/>
+            <a:off x="762000" y="2312988"/>
             <a:ext cx="7772400" cy="1039812"/>
           </a:xfrm>
           <a:prstGeom prst="rect">
@@ -3835,9 +3885,7 @@
                   <a:noFill/>
                 </a:ln>
                 <a:solidFill>
-                  <a:schemeClr val="bg1">
-                    <a:alpha val="82000"/>
-                  </a:schemeClr>
+                  <a:srgbClr val="FFFFFF"/>
                 </a:solidFill>
                 <a:effectLst>
                   <a:outerShdw blurRad="38100" sx="102000" sy="102000" algn="ctr" rotWithShape="0">
@@ -3846,20 +3894,18 @@
                     </a:prstClr>
                   </a:outerShdw>
                 </a:effectLst>
-                <a:latin typeface="Komika Parch" pitchFamily="2" charset="0"/>
+                <a:latin typeface="+mn-lt"/>
                 <a:ea typeface="+mn-ea"/>
                 <a:cs typeface="+mn-cs"/>
               </a:rPr>
-              <a:t>LEAP MOTION</a:t>
+              <a:t>Tremors with Leap Motion</a:t>
             </a:r>
             <a:endParaRPr lang="en-US" sz="5400" b="1" dirty="0">
               <a:ln w="0">
                 <a:noFill/>
               </a:ln>
               <a:solidFill>
-                <a:schemeClr val="bg1">
-                  <a:alpha val="82000"/>
-                </a:schemeClr>
+                <a:srgbClr val="FFFFFF"/>
               </a:solidFill>
               <a:effectLst>
                 <a:outerShdw blurRad="38100" sx="102000" sy="102000" algn="ctr" rotWithShape="0">
@@ -3868,7 +3914,7 @@
                   </a:prstClr>
                 </a:outerShdw>
               </a:effectLst>
-              <a:latin typeface="Komika Parch" pitchFamily="2" charset="0"/>
+              <a:latin typeface="+mn-lt"/>
               <a:ea typeface="+mn-ea"/>
               <a:cs typeface="+mn-cs"/>
             </a:endParaRPr>
@@ -4054,7 +4100,11 @@
           <a:p>
             <a:pPr algn="l"/>
             <a:r>
-              <a:rPr lang="en-US" altLang="zh-CN" sz="2800" dirty="0" smtClean="0"/>
+              <a:rPr lang="en-US" altLang="zh-CN" sz="2800" dirty="0" smtClean="0">
+                <a:solidFill>
+                  <a:srgbClr val="FFFFFF"/>
+                </a:solidFill>
+              </a:rPr>
               <a:t>		Team member:</a:t>
             </a:r>
             <a:endParaRPr lang="en-US" sz="3000" dirty="0">
@@ -4062,9 +4112,7 @@
                 <a:noFill/>
               </a:ln>
               <a:solidFill>
-                <a:schemeClr val="bg1">
-                  <a:alpha val="82000"/>
-                </a:schemeClr>
+                <a:srgbClr val="FFFFFF"/>
               </a:solidFill>
               <a:effectLst>
                 <a:outerShdw blurRad="38100" sx="102000" sy="102000" algn="ctr" rotWithShape="0">
@@ -4073,7 +4121,6 @@
                   </a:prstClr>
                 </a:outerShdw>
               </a:effectLst>
-              <a:latin typeface="Komika Parch" pitchFamily="2" charset="0"/>
             </a:endParaRPr>
           </a:p>
         </p:txBody>
@@ -4086,7 +4133,7 @@
   <p:timing>
     <p:tnLst>
       <p:par>
-        <p:cTn id="1" dur="indefinite" restart="never" nodeType="tmRoot"/>
+        <p:cTn xmlns:p14="http://schemas.microsoft.com/office/powerpoint/2010/main" id="1" dur="indefinite" restart="never" nodeType="tmRoot"/>
       </p:par>
     </p:tnLst>
   </p:timing>
@@ -4155,7 +4202,7 @@
             </a:prstGeom>
             <a:noFill/>
             <a:extLst>
-              <a:ext uri="{909E8E84-426E-40DD-AFC4-6F175D3DCCD1}">
+              <a:ext uri="{909E8E84-426E-40dd-AFC4-6F175D3DCCD1}">
                 <a14:hiddenFill xmlns:a14="http://schemas.microsoft.com/office/drawing/2010/main">
                   <a:solidFill>
                     <a:srgbClr val="FFFFFF"/>
@@ -4207,7 +4254,11 @@
             <a:lstStyle/>
             <a:p>
               <a:pPr algn="ctr"/>
-              <a:endParaRPr lang="zh-CN" altLang="en-US"/>
+              <a:endParaRPr lang="zh-CN" altLang="en-US">
+                <a:solidFill>
+                  <a:srgbClr val="FFFFFF"/>
+                </a:solidFill>
+              </a:endParaRPr>
             </a:p>
           </p:txBody>
         </p:sp>
@@ -4222,8 +4273,8 @@
         </p:nvSpPr>
         <p:spPr>
           <a:xfrm>
-            <a:off x="152400" y="504967"/>
-            <a:ext cx="3282287" cy="685799"/>
+            <a:off x="1066800" y="793172"/>
+            <a:ext cx="3971568" cy="685799"/>
           </a:xfrm>
           <a:prstGeom prst="rect">
             <a:avLst/>
@@ -4235,7 +4286,7 @@
           </a:bodyPr>
           <a:lstStyle/>
           <a:p>
-            <a:pPr marL="0" marR="0" lvl="0" indent="0" algn="ctr" defTabSz="914400" rtl="0" eaLnBrk="1" fontAlgn="auto" latinLnBrk="0" hangingPunct="1">
+            <a:pPr marL="0" marR="0" lvl="0" indent="0" defTabSz="914400" rtl="0" eaLnBrk="1" fontAlgn="auto" latinLnBrk="0" hangingPunct="1">
               <a:lnSpc>
                 <a:spcPct val="100000"/>
               </a:lnSpc>
@@ -4258,9 +4309,7 @@
                   <a:noFill/>
                 </a:ln>
                 <a:solidFill>
-                  <a:schemeClr val="bg1">
-                    <a:alpha val="82000"/>
-                  </a:schemeClr>
+                  <a:srgbClr val="FFFFFF"/>
                 </a:solidFill>
                 <a:effectLst>
                   <a:outerShdw blurRad="38100" sx="102000" sy="102000" algn="ctr" rotWithShape="0">
@@ -4269,18 +4318,15 @@
                     </a:prstClr>
                   </a:outerShdw>
                 </a:effectLst>
-                <a:latin typeface="Komika Parch" pitchFamily="2" charset="0"/>
               </a:rPr>
-              <a:t>Team Roles</a:t>
+              <a:t>The Team</a:t>
             </a:r>
             <a:endParaRPr lang="en-US" sz="4600" b="1" dirty="0">
               <a:ln w="0">
                 <a:noFill/>
               </a:ln>
               <a:solidFill>
-                <a:schemeClr val="bg1">
-                  <a:alpha val="82000"/>
-                </a:schemeClr>
+                <a:srgbClr val="FFFFFF"/>
               </a:solidFill>
               <a:effectLst>
                 <a:outerShdw blurRad="38100" sx="102000" sy="102000" algn="ctr" rotWithShape="0">
@@ -4289,7 +4335,6 @@
                   </a:prstClr>
                 </a:outerShdw>
               </a:effectLst>
-              <a:latin typeface="Komika Parch" pitchFamily="2" charset="0"/>
             </a:endParaRPr>
           </a:p>
         </p:txBody>
@@ -4303,13 +4348,13 @@
           <p:nvPr>
             <p:extLst>
               <p:ext uri="{D42A27DB-BD31-4B8C-83A1-F6EECF244321}">
-                <p14:modId xmlns:p14="http://schemas.microsoft.com/office/powerpoint/2010/main" val="1870085004"/>
+                <p14:modId xmlns:p14="http://schemas.microsoft.com/office/powerpoint/2010/main" val="3707070549"/>
               </p:ext>
             </p:extLst>
           </p:nvPr>
         </p:nvGraphicFramePr>
         <p:xfrm>
-          <a:off x="1257300" y="1752600"/>
+          <a:off x="1257300" y="1981200"/>
           <a:ext cx="6629400" cy="3429000"/>
         </p:xfrm>
         <a:graphic>
@@ -4332,7 +4377,7 @@
                       <a:r>
                         <a:rPr lang="en-AU" sz="2400" b="0" dirty="0" smtClean="0">
                           <a:solidFill>
-                            <a:schemeClr val="bg1"/>
+                            <a:srgbClr val="FFFFFF"/>
                           </a:solidFill>
                         </a:rPr>
                         <a:t>Team</a:t>
@@ -4340,14 +4385,14 @@
                       <a:r>
                         <a:rPr lang="en-AU" sz="2400" b="0" baseline="0" dirty="0" smtClean="0">
                           <a:solidFill>
-                            <a:schemeClr val="bg1"/>
+                            <a:srgbClr val="FFFFFF"/>
                           </a:solidFill>
                         </a:rPr>
                         <a:t> leader</a:t>
                       </a:r>
                       <a:endParaRPr lang="en-AU" sz="2400" b="0" dirty="0">
                         <a:solidFill>
-                          <a:schemeClr val="bg1"/>
+                          <a:srgbClr val="FFFFFF"/>
                         </a:solidFill>
                       </a:endParaRPr>
                     </a:p>
@@ -4363,7 +4408,7 @@
                       <a:r>
                         <a:rPr lang="en-AU" sz="2400" b="0" dirty="0" smtClean="0">
                           <a:solidFill>
-                            <a:schemeClr val="bg1"/>
+                            <a:srgbClr val="FFFFFF"/>
                           </a:solidFill>
                         </a:rPr>
                         <a:t>Joshua</a:t>
@@ -4371,14 +4416,14 @@
                       <a:r>
                         <a:rPr lang="en-AU" sz="2400" b="0" baseline="0" dirty="0" smtClean="0">
                           <a:solidFill>
-                            <a:schemeClr val="bg1"/>
+                            <a:srgbClr val="FFFFFF"/>
                           </a:solidFill>
                         </a:rPr>
                         <a:t> Stopper</a:t>
                       </a:r>
                       <a:endParaRPr lang="en-AU" sz="2400" b="0" dirty="0">
                         <a:solidFill>
-                          <a:schemeClr val="bg1"/>
+                          <a:srgbClr val="FFFFFF"/>
                         </a:solidFill>
                       </a:endParaRPr>
                     </a:p>
@@ -4396,14 +4441,14 @@
                       <a:r>
                         <a:rPr lang="en-AU" sz="2400" b="0" dirty="0" smtClean="0">
                           <a:solidFill>
-                            <a:schemeClr val="bg1"/>
+                            <a:srgbClr val="FFFFFF"/>
                           </a:solidFill>
                         </a:rPr>
                         <a:t>Documentation</a:t>
                       </a:r>
                       <a:endParaRPr lang="en-AU" sz="2400" b="0" dirty="0">
                         <a:solidFill>
-                          <a:schemeClr val="bg1"/>
+                          <a:srgbClr val="FFFFFF"/>
                         </a:solidFill>
                       </a:endParaRPr>
                     </a:p>
@@ -4419,7 +4464,7 @@
                       <a:r>
                         <a:rPr lang="en-AU" sz="2400" b="0" dirty="0" smtClean="0">
                           <a:solidFill>
-                            <a:schemeClr val="bg1"/>
+                            <a:srgbClr val="FFFFFF"/>
                           </a:solidFill>
                         </a:rPr>
                         <a:t>Daniel </a:t>
@@ -4427,14 +4472,14 @@
                       <a:r>
                         <a:rPr lang="en-AU" sz="2400" b="0" dirty="0" err="1" smtClean="0">
                           <a:solidFill>
-                            <a:schemeClr val="bg1"/>
+                            <a:srgbClr val="FFFFFF"/>
                           </a:solidFill>
                         </a:rPr>
                         <a:t>Corsaletti</a:t>
                       </a:r>
                       <a:endParaRPr lang="en-AU" sz="2400" b="0" dirty="0">
                         <a:solidFill>
-                          <a:schemeClr val="bg1"/>
+                          <a:srgbClr val="FFFFFF"/>
                         </a:solidFill>
                       </a:endParaRPr>
                     </a:p>
@@ -4452,14 +4497,14 @@
                       <a:r>
                         <a:rPr lang="en-AU" sz="2400" b="0" dirty="0" smtClean="0">
                           <a:solidFill>
-                            <a:schemeClr val="bg1"/>
+                            <a:srgbClr val="FFFFFF"/>
                           </a:solidFill>
                         </a:rPr>
                         <a:t>Research</a:t>
                       </a:r>
                       <a:endParaRPr lang="en-AU" sz="2400" b="0" dirty="0">
                         <a:solidFill>
-                          <a:schemeClr val="bg1"/>
+                          <a:srgbClr val="FFFFFF"/>
                         </a:solidFill>
                       </a:endParaRPr>
                     </a:p>
@@ -4475,7 +4520,7 @@
                       <a:r>
                         <a:rPr lang="en-AU" sz="2400" b="0" dirty="0" smtClean="0">
                           <a:solidFill>
-                            <a:schemeClr val="bg1"/>
+                            <a:srgbClr val="FFFFFF"/>
                           </a:solidFill>
                         </a:rPr>
                         <a:t>Tran </a:t>
@@ -4483,7 +4528,7 @@
                       <a:r>
                         <a:rPr lang="en-AU" sz="2400" b="0" dirty="0" err="1" smtClean="0">
                           <a:solidFill>
-                            <a:schemeClr val="bg1"/>
+                            <a:srgbClr val="FFFFFF"/>
                           </a:solidFill>
                         </a:rPr>
                         <a:t>Xuong</a:t>
@@ -4491,14 +4536,14 @@
                       <a:r>
                         <a:rPr lang="en-AU" sz="2400" b="0" baseline="0" dirty="0" smtClean="0">
                           <a:solidFill>
-                            <a:schemeClr val="bg1"/>
+                            <a:srgbClr val="FFFFFF"/>
                           </a:solidFill>
                         </a:rPr>
                         <a:t> Tran</a:t>
                       </a:r>
                       <a:endParaRPr lang="en-AU" sz="2400" b="0" dirty="0">
                         <a:solidFill>
-                          <a:schemeClr val="bg1"/>
+                          <a:srgbClr val="FFFFFF"/>
                         </a:solidFill>
                       </a:endParaRPr>
                     </a:p>
@@ -4516,14 +4561,14 @@
                       <a:r>
                         <a:rPr lang="en-AU" sz="2400" b="0" dirty="0" smtClean="0">
                           <a:solidFill>
-                            <a:schemeClr val="bg1"/>
+                            <a:srgbClr val="FFFFFF"/>
                           </a:solidFill>
                         </a:rPr>
                         <a:t>Testing</a:t>
                       </a:r>
                       <a:endParaRPr lang="en-AU" sz="2400" b="0" dirty="0">
                         <a:solidFill>
-                          <a:schemeClr val="bg1"/>
+                          <a:srgbClr val="FFFFFF"/>
                         </a:solidFill>
                       </a:endParaRPr>
                     </a:p>
@@ -4539,7 +4584,7 @@
                       <a:r>
                         <a:rPr lang="en-AU" sz="2400" b="0" dirty="0" err="1" smtClean="0">
                           <a:solidFill>
-                            <a:schemeClr val="bg1"/>
+                            <a:srgbClr val="FFFFFF"/>
                           </a:solidFill>
                         </a:rPr>
                         <a:t>Shengwei</a:t>
@@ -4547,14 +4592,14 @@
                       <a:r>
                         <a:rPr lang="en-AU" sz="2400" b="0" dirty="0" smtClean="0">
                           <a:solidFill>
-                            <a:schemeClr val="bg1"/>
+                            <a:srgbClr val="FFFFFF"/>
                           </a:solidFill>
                         </a:rPr>
                         <a:t> Li</a:t>
                       </a:r>
                       <a:endParaRPr lang="en-AU" sz="2400" b="0" dirty="0">
                         <a:solidFill>
-                          <a:schemeClr val="bg1"/>
+                          <a:srgbClr val="FFFFFF"/>
                         </a:solidFill>
                       </a:endParaRPr>
                     </a:p>
@@ -4572,14 +4617,14 @@
                       <a:r>
                         <a:rPr lang="en-AU" sz="2400" b="0" dirty="0" smtClean="0">
                           <a:solidFill>
-                            <a:schemeClr val="bg1"/>
+                            <a:srgbClr val="FFFFFF"/>
                           </a:solidFill>
                         </a:rPr>
                         <a:t>Technical support</a:t>
                       </a:r>
                       <a:endParaRPr lang="en-AU" sz="2400" b="0" dirty="0">
                         <a:solidFill>
-                          <a:schemeClr val="bg1"/>
+                          <a:srgbClr val="FFFFFF"/>
                         </a:solidFill>
                       </a:endParaRPr>
                     </a:p>
@@ -4595,7 +4640,7 @@
                       <a:r>
                         <a:rPr lang="en-AU" sz="2400" b="0" dirty="0" smtClean="0">
                           <a:solidFill>
-                            <a:schemeClr val="bg1"/>
+                            <a:srgbClr val="FFFFFF"/>
                           </a:solidFill>
                         </a:rPr>
                         <a:t>Minh </a:t>
@@ -4603,7 +4648,7 @@
                       <a:r>
                         <a:rPr lang="en-AU" sz="2400" b="0" dirty="0" err="1" smtClean="0">
                           <a:solidFill>
-                            <a:schemeClr val="bg1"/>
+                            <a:srgbClr val="FFFFFF"/>
                           </a:solidFill>
                         </a:rPr>
                         <a:t>Duc</a:t>
@@ -4611,14 +4656,14 @@
                       <a:r>
                         <a:rPr lang="en-AU" sz="2400" b="0" dirty="0" smtClean="0">
                           <a:solidFill>
-                            <a:schemeClr val="bg1"/>
+                            <a:srgbClr val="FFFFFF"/>
                           </a:solidFill>
                         </a:rPr>
                         <a:t> Nguyen</a:t>
                       </a:r>
                       <a:endParaRPr lang="en-AU" sz="2400" b="0" dirty="0">
                         <a:solidFill>
-                          <a:schemeClr val="bg1"/>
+                          <a:srgbClr val="FFFFFF"/>
                         </a:solidFill>
                       </a:endParaRPr>
                     </a:p>
@@ -4643,7 +4688,7 @@
   <p:timing>
     <p:tnLst>
       <p:par>
-        <p:cTn id="1" dur="indefinite" restart="never" nodeType="tmRoot"/>
+        <p:cTn xmlns:p14="http://schemas.microsoft.com/office/powerpoint/2010/main" id="1" dur="indefinite" restart="never" nodeType="tmRoot"/>
       </p:par>
     </p:tnLst>
   </p:timing>
@@ -4712,7 +4757,7 @@
             </a:prstGeom>
             <a:noFill/>
             <a:extLst>
-              <a:ext uri="{909E8E84-426E-40DD-AFC4-6F175D3DCCD1}">
+              <a:ext uri="{909E8E84-426E-40dd-AFC4-6F175D3DCCD1}">
                 <a14:hiddenFill xmlns:a14="http://schemas.microsoft.com/office/drawing/2010/main">
                   <a:solidFill>
                     <a:srgbClr val="FFFFFF"/>
@@ -4764,7 +4809,11 @@
             <a:lstStyle/>
             <a:p>
               <a:pPr algn="ctr"/>
-              <a:endParaRPr lang="zh-CN" altLang="en-US"/>
+              <a:endParaRPr lang="zh-CN" altLang="en-US">
+                <a:solidFill>
+                  <a:srgbClr val="FFFFFF"/>
+                </a:solidFill>
+              </a:endParaRPr>
             </a:p>
           </p:txBody>
         </p:sp>
@@ -4780,7 +4829,7 @@
         <p:spPr>
           <a:xfrm>
             <a:off x="299113" y="457200"/>
-            <a:ext cx="3282287" cy="685799"/>
+            <a:ext cx="5187287" cy="685799"/>
           </a:xfrm>
           <a:prstGeom prst="rect">
             <a:avLst/>
@@ -4815,9 +4864,7 @@
                   <a:noFill/>
                 </a:ln>
                 <a:solidFill>
-                  <a:schemeClr val="bg1">
-                    <a:alpha val="82000"/>
-                  </a:schemeClr>
+                  <a:srgbClr val="FFFFFF"/>
                 </a:solidFill>
                 <a:effectLst>
                   <a:outerShdw blurRad="38100" sx="102000" sy="102000" algn="ctr" rotWithShape="0">
@@ -4833,7 +4880,7 @@
             <a:r>
               <a:rPr lang="en-US" sz="4600" b="1" dirty="0">
                 <a:solidFill>
-                  <a:schemeClr val="bg1"/>
+                  <a:srgbClr val="FFFFFF"/>
                 </a:solidFill>
                 <a:latin typeface="+mj-lt"/>
                 <a:ea typeface="+mj-ea"/>
@@ -4847,9 +4894,7 @@
                   <a:noFill/>
                 </a:ln>
                 <a:solidFill>
-                  <a:schemeClr val="bg1">
-                    <a:alpha val="82000"/>
-                  </a:schemeClr>
+                  <a:srgbClr val="FFFFFF"/>
                 </a:solidFill>
                 <a:effectLst>
                   <a:outerShdw blurRad="38100" sx="102000" sy="102000" algn="ctr" rotWithShape="0">
@@ -4867,9 +4912,7 @@
                 <a:noFill/>
               </a:ln>
               <a:solidFill>
-                <a:schemeClr val="bg1">
-                  <a:alpha val="82000"/>
-                </a:schemeClr>
+                <a:srgbClr val="FFFFFF"/>
               </a:solidFill>
               <a:effectLst>
                 <a:outerShdw blurRad="38100" sx="102000" sy="102000" algn="ctr" rotWithShape="0">
@@ -4902,7 +4945,7 @@
         </p:spPr>
         <p:txBody>
           <a:bodyPr vert="horz" lIns="91440" tIns="45720" rIns="91440" bIns="45720" rtlCol="0" anchor="ctr">
-            <a:normAutofit/>
+            <a:normAutofit lnSpcReduction="10000"/>
           </a:bodyPr>
           <a:lstStyle/>
           <a:p>
@@ -4914,44 +4957,12 @@
               <a:buChar char="•"/>
             </a:pPr>
             <a:r>
-              <a:rPr lang="en-US" altLang="zh-CN" sz="2500" dirty="0" smtClean="0">
-                <a:solidFill>
-                  <a:schemeClr val="bg1"/>
+              <a:rPr lang="en-US" altLang="zh-CN" sz="2500" dirty="0">
+                <a:solidFill>
+                  <a:srgbClr val="FFFFFF"/>
                 </a:solidFill>
               </a:rPr>
-              <a:t>Over </a:t>
-            </a:r>
-            <a:r>
-              <a:rPr lang="en-US" altLang="zh-CN" sz="2500" dirty="0">
-                <a:solidFill>
-                  <a:schemeClr val="bg1"/>
-                </a:solidFill>
-              </a:rPr>
-              <a:t>one year ago, Dr. Phillip Michael from the Royal Victorian Eye &amp; Ear hospital discovered the capability of the Leap Motion Controller to track 1/100</a:t>
-            </a:r>
-            <a:r>
-              <a:rPr lang="en-US" altLang="zh-CN" sz="2500" baseline="30000" dirty="0">
-                <a:solidFill>
-                  <a:schemeClr val="bg1"/>
-                </a:solidFill>
-              </a:rPr>
-              <a:t>th</a:t>
-            </a:r>
-            <a:r>
-              <a:rPr lang="en-US" altLang="zh-CN" sz="2500" dirty="0">
-                <a:solidFill>
-                  <a:schemeClr val="bg1"/>
-                </a:solidFill>
-              </a:rPr>
-              <a:t> of a millimeter changes in the location of fingers at up to 200 times a second</a:t>
-            </a:r>
-            <a:r>
-              <a:rPr lang="en-US" altLang="zh-CN" sz="2500" dirty="0" smtClean="0">
-                <a:solidFill>
-                  <a:schemeClr val="bg1"/>
-                </a:solidFill>
-              </a:rPr>
-              <a:t>.</a:t>
+              <a:t>Our client Dr. Phillip Michael is a surgeon for the Royal Victorian Eye &amp; Ear Hospital</a:t>
             </a:r>
           </a:p>
           <a:p>
@@ -4962,39 +4973,96 @@
               <a:buFont typeface="Arial" pitchFamily="34" charset="0"/>
               <a:buChar char="•"/>
             </a:pPr>
-            <a:r>
-              <a:rPr lang="en-US" altLang="zh-CN" sz="2500" dirty="0" smtClean="0">
-                <a:solidFill>
-                  <a:schemeClr val="bg1"/>
-                </a:solidFill>
-              </a:rPr>
-              <a:t>Leap Motion Controller will attempted to be used to detect tremors in surgeons hands and display the details about points of the hand and fingers.</a:t>
-            </a:r>
-          </a:p>
-          <a:p>
-            <a:pPr algn="just">
+            <a:endParaRPr lang="en-US" altLang="zh-CN" sz="2500" dirty="0">
+              <a:solidFill>
+                <a:srgbClr val="FFFFFF"/>
+              </a:solidFill>
+            </a:endParaRPr>
+          </a:p>
+          <a:p>
+            <a:pPr marL="342900" indent="-342900" algn="just">
               <a:spcBef>
                 <a:spcPct val="0"/>
               </a:spcBef>
+              <a:buFont typeface="Arial" pitchFamily="34" charset="0"/>
+              <a:buChar char="•"/>
             </a:pPr>
-            <a:endParaRPr lang="en-US" altLang="zh-CN" sz="2000" dirty="0">
-              <a:solidFill>
-                <a:schemeClr val="bg1"/>
-              </a:solidFill>
-            </a:endParaRPr>
-          </a:p>
-          <a:p>
-            <a:pPr lvl="0">
+            <a:r>
+              <a:rPr lang="en-US" altLang="zh-CN" sz="2500" dirty="0">
+                <a:solidFill>
+                  <a:srgbClr val="FFFFFF"/>
+                </a:solidFill>
+              </a:rPr>
+              <a:t>Dr. Michael discovered the Leap Motion controller nearly a year ago</a:t>
+            </a:r>
+          </a:p>
+          <a:p>
+            <a:pPr marL="342900" indent="-342900" algn="just">
               <a:spcBef>
                 <a:spcPct val="0"/>
               </a:spcBef>
+              <a:buFont typeface="Arial" pitchFamily="34" charset="0"/>
+              <a:buChar char="•"/>
             </a:pPr>
+            <a:endParaRPr lang="en-US" altLang="zh-CN" sz="2500" dirty="0">
+              <a:solidFill>
+                <a:srgbClr val="FFFFFF"/>
+              </a:solidFill>
+            </a:endParaRPr>
+          </a:p>
+          <a:p>
+            <a:pPr marL="342900" indent="-342900" algn="just">
+              <a:spcBef>
+                <a:spcPct val="0"/>
+              </a:spcBef>
+              <a:buFont typeface="Arial" pitchFamily="34" charset="0"/>
+              <a:buChar char="•"/>
+            </a:pPr>
+            <a:r>
+              <a:rPr lang="en-US" altLang="zh-CN" sz="2500" dirty="0">
+                <a:solidFill>
+                  <a:srgbClr val="FFFFFF"/>
+                </a:solidFill>
+              </a:rPr>
+              <a:t>Wants to be able to detect tremors in doctors and patients hands in a non invasive and costly manner</a:t>
+            </a:r>
+          </a:p>
+          <a:p>
+            <a:pPr marL="342900" indent="-342900" algn="just">
+              <a:spcBef>
+                <a:spcPct val="0"/>
+              </a:spcBef>
+              <a:buFont typeface="Arial" pitchFamily="34" charset="0"/>
+              <a:buChar char="•"/>
+            </a:pPr>
+            <a:endParaRPr lang="en-US" altLang="zh-CN" sz="2500" dirty="0">
+              <a:solidFill>
+                <a:srgbClr val="FFFFFF"/>
+              </a:solidFill>
+            </a:endParaRPr>
+          </a:p>
+          <a:p>
+            <a:pPr marL="342900" indent="-342900" algn="just">
+              <a:spcBef>
+                <a:spcPct val="0"/>
+              </a:spcBef>
+              <a:buFont typeface="Arial" pitchFamily="34" charset="0"/>
+              <a:buChar char="•"/>
+            </a:pPr>
+            <a:r>
+              <a:rPr lang="en-US" altLang="zh-CN" sz="2500" dirty="0">
+                <a:solidFill>
+                  <a:srgbClr val="FFFFFF"/>
+                </a:solidFill>
+              </a:rPr>
+              <a:t>Wants to utilize the Leap Motion Controller to accomplish this</a:t>
+            </a:r>
             <a:endParaRPr kumimoji="0" lang="en-US" sz="2400" b="0" i="0" u="none" strike="noStrike" kern="1200" cap="none" spc="0" normalizeH="0" baseline="0" noProof="0" dirty="0">
               <a:ln>
                 <a:noFill/>
               </a:ln>
               <a:solidFill>
-                <a:schemeClr val="bg1"/>
+                <a:srgbClr val="FFFFFF"/>
               </a:solidFill>
               <a:effectLst/>
               <a:uLnTx/>
@@ -5019,7 +5087,7 @@
   <p:timing>
     <p:tnLst>
       <p:par>
-        <p:cTn id="1" dur="indefinite" restart="never" nodeType="tmRoot"/>
+        <p:cTn xmlns:p14="http://schemas.microsoft.com/office/powerpoint/2010/main" id="1" dur="indefinite" restart="never" nodeType="tmRoot"/>
       </p:par>
     </p:tnLst>
   </p:timing>
@@ -5088,7 +5156,7 @@
             </a:prstGeom>
             <a:noFill/>
             <a:extLst>
-              <a:ext uri="{909E8E84-426E-40DD-AFC4-6F175D3DCCD1}">
+              <a:ext uri="{909E8E84-426E-40dd-AFC4-6F175D3DCCD1}">
                 <a14:hiddenFill xmlns:a14="http://schemas.microsoft.com/office/drawing/2010/main">
                   <a:solidFill>
                     <a:srgbClr val="FFFFFF"/>
@@ -5140,7 +5208,11 @@
             <a:lstStyle/>
             <a:p>
               <a:pPr algn="ctr"/>
-              <a:endParaRPr lang="zh-CN" altLang="en-US"/>
+              <a:endParaRPr lang="zh-CN" altLang="en-US">
+                <a:solidFill>
+                  <a:srgbClr val="FFFFFF"/>
+                </a:solidFill>
+              </a:endParaRPr>
             </a:p>
           </p:txBody>
         </p:sp>
@@ -5191,9 +5263,7 @@
                   <a:noFill/>
                 </a:ln>
                 <a:solidFill>
-                  <a:schemeClr val="bg1">
-                    <a:alpha val="82000"/>
-                  </a:schemeClr>
+                  <a:srgbClr val="FFFFFF"/>
                 </a:solidFill>
                 <a:effectLst>
                   <a:outerShdw blurRad="38100" sx="102000" sy="102000" algn="ctr" rotWithShape="0">
@@ -5211,9 +5281,7 @@
                 <a:noFill/>
               </a:ln>
               <a:solidFill>
-                <a:schemeClr val="bg1">
-                  <a:alpha val="82000"/>
-                </a:schemeClr>
+                <a:srgbClr val="FFFFFF"/>
               </a:solidFill>
               <a:effectLst>
                 <a:outerShdw blurRad="38100" sx="102000" sy="102000" algn="ctr" rotWithShape="0">
@@ -5282,7 +5350,7 @@
                 <a:ea typeface="+mj-ea"/>
                 <a:cs typeface="+mj-cs"/>
               </a:rPr>
-              <a:t>Pre-operative to determine</a:t>
+              <a:t>Pre-operative test for tremor</a:t>
             </a:r>
             <a:r>
               <a:rPr kumimoji="0" lang="en-US" sz="2500" b="0" i="0" strike="noStrike" kern="1200" cap="none" spc="0" normalizeH="0" noProof="0" dirty="0" smtClean="0">
@@ -5310,7 +5378,7 @@
                 <a:ea typeface="+mj-ea"/>
                 <a:cs typeface="+mj-cs"/>
               </a:rPr>
-              <a:t>in surgeons test</a:t>
+              <a:t>in surgeons</a:t>
             </a:r>
           </a:p>
           <a:p>
@@ -5373,7 +5441,7 @@
                 <a:ea typeface="+mj-ea"/>
                 <a:cs typeface="+mj-cs"/>
               </a:rPr>
-              <a:t>Drs.</a:t>
+              <a:t>Test for tremor</a:t>
             </a:r>
             <a:r>
               <a:rPr kumimoji="0" lang="en-US" sz="2500" b="0" i="0" strike="noStrike" kern="1200" cap="none" spc="0" normalizeH="0" noProof="0" dirty="0" smtClean="0">
@@ -5390,7 +5458,7 @@
                 <a:ea typeface="+mj-ea"/>
                 <a:cs typeface="+mj-cs"/>
               </a:rPr>
-              <a:t> Clinics testing tremors in patients for comparing</a:t>
+              <a:t> in patients in a doctors clinic</a:t>
             </a:r>
           </a:p>
           <a:p>
@@ -5453,7 +5521,7 @@
                 <a:ea typeface="+mj-ea"/>
                 <a:cs typeface="+mj-cs"/>
               </a:rPr>
-              <a:t>Can</a:t>
+              <a:t>Results can be</a:t>
             </a:r>
             <a:r>
               <a:rPr lang="en-US" sz="2500" dirty="0" smtClean="0">
@@ -5464,7 +5532,7 @@
                 <a:ea typeface="+mj-ea"/>
                 <a:cs typeface="+mj-cs"/>
               </a:rPr>
-              <a:t> be tested in real time</a:t>
+              <a:t> returned immediately after test</a:t>
             </a:r>
           </a:p>
           <a:p>
@@ -5527,7 +5595,7 @@
                 <a:ea typeface="+mj-ea"/>
                 <a:cs typeface="+mj-cs"/>
               </a:rPr>
-              <a:t>Can be detected</a:t>
+              <a:t>The test can be conducted</a:t>
             </a:r>
             <a:r>
               <a:rPr kumimoji="0" lang="en-US" sz="2500" b="0" i="0" strike="noStrike" kern="1200" cap="none" spc="0" normalizeH="0" noProof="0" dirty="0" smtClean="0">
@@ -5544,22 +5612,8 @@
                 <a:ea typeface="+mj-ea"/>
                 <a:cs typeface="+mj-cs"/>
               </a:rPr>
-              <a:t> in a non intrusive way</a:t>
-            </a:r>
-            <a:endParaRPr kumimoji="0" lang="en-US" sz="2500" b="0" i="0" strike="noStrike" kern="1200" cap="none" spc="0" normalizeH="0" baseline="0" noProof="0" dirty="0" smtClean="0">
-              <a:ln>
-                <a:noFill/>
-              </a:ln>
-              <a:solidFill>
-                <a:srgbClr val="FFFFFF"/>
-              </a:solidFill>
-              <a:effectLst/>
-              <a:uLnTx/>
-              <a:uFillTx/>
-              <a:latin typeface="+mj-lt"/>
-              <a:ea typeface="+mj-ea"/>
-              <a:cs typeface="+mj-cs"/>
-            </a:endParaRPr>
+              <a:t> in a non intrusive manner</a:t>
+            </a:r>
           </a:p>
         </p:txBody>
       </p:sp>
@@ -5576,7 +5630,7 @@
   <p:timing>
     <p:tnLst>
       <p:par>
-        <p:cTn id="1" dur="indefinite" restart="never" nodeType="tmRoot"/>
+        <p:cTn xmlns:p14="http://schemas.microsoft.com/office/powerpoint/2010/main" id="1" dur="indefinite" restart="never" nodeType="tmRoot"/>
       </p:par>
     </p:tnLst>
   </p:timing>
@@ -5645,7 +5699,7 @@
             </a:prstGeom>
             <a:noFill/>
             <a:extLst>
-              <a:ext uri="{909E8E84-426E-40DD-AFC4-6F175D3DCCD1}">
+              <a:ext uri="{909E8E84-426E-40dd-AFC4-6F175D3DCCD1}">
                 <a14:hiddenFill xmlns:a14="http://schemas.microsoft.com/office/drawing/2010/main">
                   <a:solidFill>
                     <a:srgbClr val="FFFFFF"/>
@@ -5697,7 +5751,11 @@
             <a:lstStyle/>
             <a:p>
               <a:pPr algn="ctr"/>
-              <a:endParaRPr lang="zh-CN" altLang="en-US"/>
+              <a:endParaRPr lang="zh-CN" altLang="en-US">
+                <a:solidFill>
+                  <a:srgbClr val="FFFFFF"/>
+                </a:solidFill>
+              </a:endParaRPr>
             </a:p>
           </p:txBody>
         </p:sp>
@@ -5712,7 +5770,7 @@
         </p:nvSpPr>
         <p:spPr>
           <a:xfrm>
-            <a:off x="304800" y="1676400"/>
+            <a:off x="609600" y="1524000"/>
             <a:ext cx="8229600" cy="4114800"/>
           </a:xfrm>
           <a:prstGeom prst="rect">
@@ -5742,6 +5800,114 @@
               <a:tabLst/>
               <a:defRPr/>
             </a:pPr>
+            <a:endParaRPr kumimoji="0" lang="en-US" sz="2500" b="0" i="0" strike="noStrike" kern="1200" cap="none" spc="0" normalizeH="0" baseline="0" noProof="0" dirty="0" smtClean="0">
+              <a:ln>
+                <a:noFill/>
+              </a:ln>
+              <a:solidFill>
+                <a:srgbClr val="FFFFFF"/>
+              </a:solidFill>
+              <a:effectLst/>
+              <a:uLnTx/>
+              <a:uFillTx/>
+              <a:latin typeface="+mj-lt"/>
+              <a:ea typeface="+mj-ea"/>
+              <a:cs typeface="+mj-cs"/>
+            </a:endParaRPr>
+          </a:p>
+          <a:p>
+            <a:pPr marR="0" lvl="0" defTabSz="914400" rtl="0" eaLnBrk="1" fontAlgn="auto" latinLnBrk="0" hangingPunct="1">
+              <a:lnSpc>
+                <a:spcPct val="100000"/>
+              </a:lnSpc>
+              <a:spcBef>
+                <a:spcPct val="0"/>
+              </a:spcBef>
+              <a:spcAft>
+                <a:spcPts val="0"/>
+              </a:spcAft>
+              <a:buClrTx/>
+              <a:buSzTx/>
+              <a:tabLst/>
+              <a:defRPr/>
+            </a:pPr>
+            <a:r>
+              <a:rPr lang="en-US" sz="2500" dirty="0" smtClean="0">
+                <a:solidFill>
+                  <a:srgbClr val="FFFFFF"/>
+                </a:solidFill>
+                <a:latin typeface="+mj-lt"/>
+                <a:ea typeface="+mj-ea"/>
+                <a:cs typeface="+mj-cs"/>
+              </a:rPr>
+              <a:t>Using the </a:t>
+            </a:r>
+            <a:r>
+              <a:rPr lang="en-US" sz="2500" dirty="0">
+                <a:solidFill>
+                  <a:srgbClr val="FFFFFF"/>
+                </a:solidFill>
+                <a:latin typeface="+mj-lt"/>
+                <a:ea typeface="+mj-ea"/>
+                <a:cs typeface="+mj-cs"/>
+              </a:rPr>
+              <a:t>L</a:t>
+            </a:r>
+            <a:r>
+              <a:rPr lang="en-US" sz="2500" dirty="0" smtClean="0">
+                <a:solidFill>
+                  <a:srgbClr val="FFFFFF"/>
+                </a:solidFill>
+                <a:latin typeface="+mj-lt"/>
+                <a:ea typeface="+mj-ea"/>
+                <a:cs typeface="+mj-cs"/>
+              </a:rPr>
+              <a:t>eap Motion controller we will</a:t>
+            </a:r>
+          </a:p>
+          <a:p>
+            <a:pPr marR="0" lvl="0" defTabSz="914400" rtl="0" eaLnBrk="1" fontAlgn="auto" latinLnBrk="0" hangingPunct="1">
+              <a:lnSpc>
+                <a:spcPct val="100000"/>
+              </a:lnSpc>
+              <a:spcBef>
+                <a:spcPct val="0"/>
+              </a:spcBef>
+              <a:spcAft>
+                <a:spcPts val="0"/>
+              </a:spcAft>
+              <a:buClrTx/>
+              <a:buSzTx/>
+              <a:tabLst/>
+              <a:defRPr/>
+            </a:pPr>
+            <a:endParaRPr lang="en-US" sz="2500" dirty="0">
+              <a:solidFill>
+                <a:srgbClr val="FFFFFF"/>
+              </a:solidFill>
+              <a:latin typeface="+mj-lt"/>
+              <a:ea typeface="+mj-ea"/>
+              <a:cs typeface="+mj-cs"/>
+            </a:endParaRPr>
+          </a:p>
+          <a:p>
+            <a:pPr marL="457200" marR="0" lvl="0" indent="-457200" defTabSz="914400" rtl="0" eaLnBrk="1" fontAlgn="auto" latinLnBrk="0" hangingPunct="1">
+              <a:lnSpc>
+                <a:spcPct val="100000"/>
+              </a:lnSpc>
+              <a:spcBef>
+                <a:spcPct val="0"/>
+              </a:spcBef>
+              <a:spcAft>
+                <a:spcPts val="0"/>
+              </a:spcAft>
+              <a:buClrTx/>
+              <a:buSzTx/>
+              <a:buFont typeface="Arial" pitchFamily="34" charset="0"/>
+              <a:buChar char="•"/>
+              <a:tabLst/>
+              <a:defRPr/>
+            </a:pPr>
             <a:r>
               <a:rPr kumimoji="0" lang="en-US" sz="2500" b="0" i="0" strike="noStrike" kern="1200" cap="none" spc="0" normalizeH="0" baseline="0" noProof="0" dirty="0" smtClean="0">
                 <a:ln>
@@ -5757,10 +5923,10 @@
                 <a:ea typeface="+mj-ea"/>
                 <a:cs typeface="+mj-cs"/>
               </a:rPr>
-              <a:t>Display the level</a:t>
-            </a:r>
-            <a:r>
-              <a:rPr kumimoji="0" lang="en-US" sz="2500" b="0" i="0" strike="noStrike" kern="1200" cap="none" spc="0" normalizeH="0" noProof="0" dirty="0" smtClean="0">
+              <a:t>Display </a:t>
+            </a:r>
+            <a:r>
+              <a:rPr kumimoji="0" lang="en-US" sz="2500" b="0" i="0" strike="noStrike" kern="1200" cap="none" spc="0" normalizeH="0" baseline="0" noProof="0" dirty="0" smtClean="0">
                 <a:ln>
                   <a:noFill/>
                 </a:ln>
@@ -5774,7 +5940,58 @@
                 <a:ea typeface="+mj-ea"/>
                 <a:cs typeface="+mj-cs"/>
               </a:rPr>
-              <a:t> of tremor in the hand</a:t>
+              <a:t>the </a:t>
+            </a:r>
+            <a:r>
+              <a:rPr kumimoji="0" lang="en-US" sz="2500" b="0" i="0" strike="noStrike" kern="1200" cap="none" spc="0" normalizeH="0" baseline="0" noProof="0" dirty="0" smtClean="0">
+                <a:ln>
+                  <a:noFill/>
+                </a:ln>
+                <a:solidFill>
+                  <a:srgbClr val="FFFFFF"/>
+                </a:solidFill>
+                <a:effectLst/>
+                <a:uLnTx/>
+                <a:uFillTx/>
+                <a:latin typeface="+mj-lt"/>
+                <a:ea typeface="+mj-ea"/>
+                <a:cs typeface="+mj-cs"/>
+              </a:rPr>
+              <a:t>frequency(hertz)</a:t>
+            </a:r>
+            <a:r>
+              <a:rPr kumimoji="0" lang="en-US" sz="2500" b="0" i="0" strike="noStrike" kern="1200" cap="none" spc="0" normalizeH="0" noProof="0" dirty="0" smtClean="0">
+                <a:ln>
+                  <a:noFill/>
+                </a:ln>
+                <a:solidFill>
+                  <a:srgbClr val="FFFFFF"/>
+                </a:solidFill>
+                <a:effectLst/>
+                <a:uLnTx/>
+                <a:uFillTx/>
+                <a:latin typeface="+mj-lt"/>
+                <a:ea typeface="+mj-ea"/>
+                <a:cs typeface="+mj-cs"/>
+              </a:rPr>
+              <a:t> of </a:t>
+            </a:r>
+            <a:r>
+              <a:rPr kumimoji="0" lang="en-US" sz="2500" b="0" i="0" strike="noStrike" kern="1200" cap="none" spc="0" normalizeH="0" noProof="0" dirty="0" smtClean="0">
+                <a:ln>
+                  <a:noFill/>
+                </a:ln>
+                <a:solidFill>
+                  <a:srgbClr val="FFFFFF"/>
+                </a:solidFill>
+                <a:effectLst/>
+                <a:uLnTx/>
+                <a:uFillTx/>
+                <a:latin typeface="+mj-lt"/>
+                <a:ea typeface="+mj-ea"/>
+                <a:cs typeface="+mj-cs"/>
+              </a:rPr>
+              <a:t>tremor in the hand</a:t>
             </a:r>
           </a:p>
           <a:p>
@@ -5837,7 +6054,7 @@
                 <a:ea typeface="+mj-ea"/>
                 <a:cs typeface="+mj-cs"/>
               </a:rPr>
-              <a:t>Contains</a:t>
+              <a:t>Include prompts</a:t>
             </a:r>
             <a:r>
               <a:rPr lang="en-US" sz="2500" dirty="0" smtClean="0">
@@ -5848,7 +6065,120 @@
                 <a:ea typeface="+mj-ea"/>
                 <a:cs typeface="+mj-cs"/>
               </a:rPr>
-              <a:t> brief tutorials in use of the software</a:t>
+              <a:t> build into the software to direct users</a:t>
+            </a:r>
+            <a:endParaRPr lang="en-US" sz="2500" dirty="0" smtClean="0">
+              <a:solidFill>
+                <a:srgbClr val="FFFFFF"/>
+              </a:solidFill>
+              <a:latin typeface="+mj-lt"/>
+              <a:ea typeface="+mj-ea"/>
+              <a:cs typeface="+mj-cs"/>
+            </a:endParaRPr>
+          </a:p>
+          <a:p>
+            <a:pPr marR="0" lvl="0" defTabSz="914400" rtl="0" eaLnBrk="1" fontAlgn="auto" latinLnBrk="0" hangingPunct="1">
+              <a:lnSpc>
+                <a:spcPct val="100000"/>
+              </a:lnSpc>
+              <a:spcBef>
+                <a:spcPct val="0"/>
+              </a:spcBef>
+              <a:spcAft>
+                <a:spcPts val="0"/>
+              </a:spcAft>
+              <a:buClrTx/>
+              <a:buSzTx/>
+              <a:tabLst/>
+              <a:defRPr/>
+            </a:pPr>
+            <a:endParaRPr kumimoji="0" lang="en-US" sz="2500" b="0" i="0" strike="noStrike" kern="1200" cap="none" spc="0" normalizeH="0" noProof="0" dirty="0" smtClean="0">
+              <a:ln>
+                <a:noFill/>
+              </a:ln>
+              <a:solidFill>
+                <a:srgbClr val="FFFFFF"/>
+              </a:solidFill>
+              <a:effectLst/>
+              <a:uLnTx/>
+              <a:uFillTx/>
+              <a:latin typeface="+mj-lt"/>
+              <a:ea typeface="+mj-ea"/>
+              <a:cs typeface="+mj-cs"/>
+            </a:endParaRPr>
+          </a:p>
+          <a:p>
+            <a:pPr marL="457200" marR="0" lvl="0" indent="-457200" defTabSz="914400" rtl="0" eaLnBrk="1" fontAlgn="auto" latinLnBrk="0" hangingPunct="1">
+              <a:lnSpc>
+                <a:spcPct val="100000"/>
+              </a:lnSpc>
+              <a:spcBef>
+                <a:spcPct val="0"/>
+              </a:spcBef>
+              <a:spcAft>
+                <a:spcPts val="0"/>
+              </a:spcAft>
+              <a:buClrTx/>
+              <a:buSzTx/>
+              <a:buFont typeface="Arial" pitchFamily="34" charset="0"/>
+              <a:buChar char="•"/>
+              <a:tabLst/>
+              <a:defRPr/>
+            </a:pPr>
+            <a:r>
+              <a:rPr lang="en-US" sz="2500" baseline="0" dirty="0" smtClean="0">
+                <a:solidFill>
+                  <a:srgbClr val="FFFFFF"/>
+                </a:solidFill>
+                <a:latin typeface="+mj-lt"/>
+                <a:ea typeface="+mj-ea"/>
+                <a:cs typeface="+mj-cs"/>
+              </a:rPr>
+              <a:t>Save </a:t>
+            </a:r>
+            <a:r>
+              <a:rPr lang="en-US" sz="2500" dirty="0" smtClean="0">
+                <a:solidFill>
+                  <a:srgbClr val="FFFFFF"/>
+                </a:solidFill>
+                <a:latin typeface="+mj-lt"/>
+                <a:ea typeface="+mj-ea"/>
+                <a:cs typeface="+mj-cs"/>
+              </a:rPr>
+              <a:t>data </a:t>
+            </a:r>
+            <a:r>
+              <a:rPr lang="en-US" sz="2500" dirty="0" smtClean="0">
+                <a:solidFill>
+                  <a:srgbClr val="FFFFFF"/>
+                </a:solidFill>
+                <a:latin typeface="+mj-lt"/>
+                <a:ea typeface="+mj-ea"/>
+                <a:cs typeface="+mj-cs"/>
+              </a:rPr>
+              <a:t>recorded </a:t>
+            </a:r>
+            <a:r>
+              <a:rPr lang="en-US" sz="2500" dirty="0" smtClean="0">
+                <a:solidFill>
+                  <a:srgbClr val="FFFFFF"/>
+                </a:solidFill>
+                <a:latin typeface="+mj-lt"/>
+                <a:ea typeface="+mj-ea"/>
+                <a:cs typeface="+mj-cs"/>
+              </a:rPr>
+              <a:t>from the Leap </a:t>
+            </a:r>
+            <a:r>
+              <a:rPr lang="en-US" sz="2500" dirty="0" smtClean="0">
+                <a:solidFill>
+                  <a:srgbClr val="FFFFFF"/>
+                </a:solidFill>
+                <a:latin typeface="+mj-lt"/>
+                <a:ea typeface="+mj-ea"/>
+                <a:cs typeface="+mj-cs"/>
+              </a:rPr>
+              <a:t>Motion device to a file</a:t>
             </a:r>
           </a:p>
           <a:p>
@@ -5911,7 +6241,7 @@
                 <a:ea typeface="+mj-ea"/>
                 <a:cs typeface="+mj-cs"/>
               </a:rPr>
-              <a:t>Contains</a:t>
+              <a:t>Load </a:t>
             </a:r>
             <a:r>
               <a:rPr kumimoji="0" lang="en-US" sz="2500" b="0" i="0" strike="noStrike" kern="1200" cap="none" spc="0" normalizeH="0" noProof="0" dirty="0" smtClean="0">
@@ -5928,7 +6258,7 @@
                 <a:ea typeface="+mj-ea"/>
                 <a:cs typeface="+mj-cs"/>
               </a:rPr>
-              <a:t> instruction in real time</a:t>
+              <a:t>data from a file for analysis</a:t>
             </a:r>
           </a:p>
           <a:p>
@@ -5991,7 +6321,7 @@
                 <a:ea typeface="+mj-ea"/>
                 <a:cs typeface="+mj-cs"/>
               </a:rPr>
-              <a:t>Export</a:t>
+              <a:t>Replay multiple </a:t>
             </a:r>
             <a:r>
               <a:rPr lang="en-US" sz="2500" dirty="0" smtClean="0">
@@ -6002,161 +6332,29 @@
                 <a:ea typeface="+mj-ea"/>
                 <a:cs typeface="+mj-cs"/>
               </a:rPr>
-              <a:t> data recorded by Leap Motion device to a file</a:t>
-            </a:r>
-          </a:p>
-          <a:p>
-            <a:pPr marL="457200" marR="0" lvl="0" indent="-457200" defTabSz="914400" rtl="0" eaLnBrk="1" fontAlgn="auto" latinLnBrk="0" hangingPunct="1">
-              <a:lnSpc>
-                <a:spcPct val="100000"/>
-              </a:lnSpc>
-              <a:spcBef>
-                <a:spcPct val="0"/>
-              </a:spcBef>
-              <a:spcAft>
-                <a:spcPts val="0"/>
-              </a:spcAft>
-              <a:buClrTx/>
-              <a:buSzTx/>
-              <a:buFont typeface="Arial" pitchFamily="34" charset="0"/>
-              <a:buChar char="•"/>
-              <a:tabLst/>
-              <a:defRPr/>
-            </a:pPr>
-            <a:endParaRPr lang="en-US" sz="2500" dirty="0" smtClean="0">
-              <a:solidFill>
-                <a:srgbClr val="FFFFFF"/>
-              </a:solidFill>
-              <a:latin typeface="+mj-lt"/>
-              <a:ea typeface="+mj-ea"/>
-              <a:cs typeface="+mj-cs"/>
-            </a:endParaRPr>
-          </a:p>
-          <a:p>
-            <a:pPr marL="457200" marR="0" lvl="0" indent="-457200" defTabSz="914400" rtl="0" eaLnBrk="1" fontAlgn="auto" latinLnBrk="0" hangingPunct="1">
-              <a:lnSpc>
-                <a:spcPct val="100000"/>
-              </a:lnSpc>
-              <a:spcBef>
-                <a:spcPct val="0"/>
-              </a:spcBef>
-              <a:spcAft>
-                <a:spcPts val="0"/>
-              </a:spcAft>
-              <a:buClrTx/>
-              <a:buSzTx/>
-              <a:buFont typeface="Arial" pitchFamily="34" charset="0"/>
-              <a:buChar char="•"/>
-              <a:tabLst/>
-              <a:defRPr/>
-            </a:pPr>
-            <a:r>
-              <a:rPr kumimoji="0" lang="en-US" sz="2500" b="0" i="0" strike="noStrike" kern="1200" cap="none" spc="0" normalizeH="0" baseline="0" noProof="0" dirty="0" smtClean="0">
-                <a:ln>
-                  <a:noFill/>
-                </a:ln>
+              <a:t>sets </a:t>
+            </a:r>
+            <a:r>
+              <a:rPr lang="en-US" sz="2500" dirty="0" smtClean="0">
                 <a:solidFill>
                   <a:srgbClr val="FFFFFF"/>
                 </a:solidFill>
-                <a:effectLst/>
-                <a:uLnTx/>
-                <a:uFillTx/>
                 <a:latin typeface="+mj-lt"/>
                 <a:ea typeface="+mj-ea"/>
                 <a:cs typeface="+mj-cs"/>
               </a:rPr>
-              <a:t>Import</a:t>
-            </a:r>
-            <a:r>
-              <a:rPr kumimoji="0" lang="en-US" sz="2500" b="0" i="0" strike="noStrike" kern="1200" cap="none" spc="0" normalizeH="0" noProof="0" dirty="0" smtClean="0">
-                <a:ln>
-                  <a:noFill/>
-                </a:ln>
+              <a:t>of data </a:t>
+            </a:r>
+            <a:r>
+              <a:rPr lang="en-US" sz="2500" dirty="0" smtClean="0">
                 <a:solidFill>
                   <a:srgbClr val="FFFFFF"/>
                 </a:solidFill>
-                <a:effectLst/>
-                <a:uLnTx/>
-                <a:uFillTx/>
                 <a:latin typeface="+mj-lt"/>
                 <a:ea typeface="+mj-ea"/>
                 <a:cs typeface="+mj-cs"/>
               </a:rPr>
-              <a:t> data saved to a file for analysis</a:t>
-            </a:r>
-          </a:p>
-          <a:p>
-            <a:pPr marL="457200" marR="0" lvl="0" indent="-457200" defTabSz="914400" rtl="0" eaLnBrk="1" fontAlgn="auto" latinLnBrk="0" hangingPunct="1">
-              <a:lnSpc>
-                <a:spcPct val="100000"/>
-              </a:lnSpc>
-              <a:spcBef>
-                <a:spcPct val="0"/>
-              </a:spcBef>
-              <a:spcAft>
-                <a:spcPts val="0"/>
-              </a:spcAft>
-              <a:buClrTx/>
-              <a:buSzTx/>
-              <a:buFont typeface="Arial" pitchFamily="34" charset="0"/>
-              <a:buChar char="•"/>
-              <a:tabLst/>
-              <a:defRPr/>
-            </a:pPr>
-            <a:endParaRPr kumimoji="0" lang="en-US" sz="2500" b="0" i="0" strike="noStrike" kern="1200" cap="none" spc="0" normalizeH="0" noProof="0" dirty="0" smtClean="0">
-              <a:ln>
-                <a:noFill/>
-              </a:ln>
-              <a:solidFill>
-                <a:srgbClr val="FFFFFF"/>
-              </a:solidFill>
-              <a:effectLst/>
-              <a:uLnTx/>
-              <a:uFillTx/>
-              <a:latin typeface="+mj-lt"/>
-              <a:ea typeface="+mj-ea"/>
-              <a:cs typeface="+mj-cs"/>
-            </a:endParaRPr>
-          </a:p>
-          <a:p>
-            <a:pPr marL="457200" marR="0" lvl="0" indent="-457200" defTabSz="914400" rtl="0" eaLnBrk="1" fontAlgn="auto" latinLnBrk="0" hangingPunct="1">
-              <a:lnSpc>
-                <a:spcPct val="100000"/>
-              </a:lnSpc>
-              <a:spcBef>
-                <a:spcPct val="0"/>
-              </a:spcBef>
-              <a:spcAft>
-                <a:spcPts val="0"/>
-              </a:spcAft>
-              <a:buClrTx/>
-              <a:buSzTx/>
-              <a:buFont typeface="Arial" pitchFamily="34" charset="0"/>
-              <a:buChar char="•"/>
-              <a:tabLst/>
-              <a:defRPr/>
-            </a:pPr>
-            <a:r>
-              <a:rPr lang="en-US" sz="2500" baseline="0" dirty="0" smtClean="0">
-                <a:solidFill>
-                  <a:srgbClr val="FFFFFF"/>
-                </a:solidFill>
-                <a:latin typeface="+mj-lt"/>
-                <a:ea typeface="+mj-ea"/>
-                <a:cs typeface="+mj-cs"/>
-              </a:rPr>
-              <a:t>Replay</a:t>
-            </a:r>
-            <a:r>
-              <a:rPr lang="en-US" sz="2500" dirty="0" smtClean="0">
-                <a:solidFill>
-                  <a:srgbClr val="FFFFFF"/>
-                </a:solidFill>
-                <a:latin typeface="+mj-lt"/>
-                <a:ea typeface="+mj-ea"/>
-                <a:cs typeface="+mj-cs"/>
-              </a:rPr>
-              <a:t> two sets of data for comparison</a:t>
+              <a:t>for real time comparison</a:t>
             </a:r>
             <a:endParaRPr kumimoji="0" lang="en-US" sz="2500" b="0" i="0" strike="noStrike" kern="1200" cap="none" spc="0" normalizeH="0" baseline="0" noProof="0" dirty="0" smtClean="0">
               <a:ln>
@@ -6186,7 +6384,7 @@
         <p:spPr>
           <a:xfrm>
             <a:off x="292289" y="464024"/>
-            <a:ext cx="3129887" cy="685799"/>
+            <a:ext cx="4660711" cy="685799"/>
           </a:xfrm>
           <a:prstGeom prst="rect">
             <a:avLst/>
@@ -6221,9 +6419,7 @@
                   <a:noFill/>
                 </a:ln>
                 <a:solidFill>
-                  <a:schemeClr val="bg1">
-                    <a:alpha val="82000"/>
-                  </a:schemeClr>
+                  <a:srgbClr val="FFFFFF"/>
                 </a:solidFill>
                 <a:effectLst>
                   <a:outerShdw blurRad="38100" sx="102000" sy="102000" algn="ctr" rotWithShape="0">
@@ -6241,9 +6437,7 @@
                 <a:noFill/>
               </a:ln>
               <a:solidFill>
-                <a:schemeClr val="bg1">
-                  <a:alpha val="82000"/>
-                </a:schemeClr>
+                <a:srgbClr val="FFFFFF"/>
               </a:solidFill>
               <a:effectLst>
                 <a:outerShdw blurRad="38100" sx="102000" sy="102000" algn="ctr" rotWithShape="0">
@@ -6270,7 +6464,7 @@
   <p:timing>
     <p:tnLst>
       <p:par>
-        <p:cTn id="1" dur="indefinite" restart="never" nodeType="tmRoot"/>
+        <p:cTn xmlns:p14="http://schemas.microsoft.com/office/powerpoint/2010/main" id="1" dur="indefinite" restart="never" nodeType="tmRoot"/>
       </p:par>
     </p:tnLst>
   </p:timing>
@@ -6325,7 +6519,7 @@
           </a:prstGeom>
           <a:noFill/>
           <a:extLst>
-            <a:ext uri="{909E8E84-426E-40DD-AFC4-6F175D3DCCD1}">
+            <a:ext uri="{909E8E84-426E-40dd-AFC4-6F175D3DCCD1}">
               <a14:hiddenFill xmlns:a14="http://schemas.microsoft.com/office/drawing/2010/main">
                 <a:solidFill>
                   <a:srgbClr val="FFFFFF"/>
@@ -6377,43 +6571,9 @@
             <a:r>
               <a:rPr lang="en-US" altLang="zh-CN" sz="8000" b="1" cap="all" dirty="0" smtClean="0">
                 <a:ln w="0"/>
-                <a:gradFill flip="none">
-                  <a:gsLst>
-                    <a:gs pos="0">
-                      <a:schemeClr val="accent1">
-                        <a:tint val="75000"/>
-                        <a:shade val="75000"/>
-                        <a:satMod val="170000"/>
-                      </a:schemeClr>
-                    </a:gs>
-                    <a:gs pos="49000">
-                      <a:schemeClr val="accent1">
-                        <a:tint val="88000"/>
-                        <a:shade val="65000"/>
-                        <a:satMod val="172000"/>
-                      </a:schemeClr>
-                    </a:gs>
-                    <a:gs pos="50000">
-                      <a:schemeClr val="accent1">
-                        <a:shade val="65000"/>
-                        <a:satMod val="130000"/>
-                      </a:schemeClr>
-                    </a:gs>
-                    <a:gs pos="92000">
-                      <a:schemeClr val="accent1">
-                        <a:shade val="50000"/>
-                        <a:satMod val="120000"/>
-                      </a:schemeClr>
-                    </a:gs>
-                    <a:gs pos="100000">
-                      <a:schemeClr val="accent1">
-                        <a:shade val="48000"/>
-                        <a:satMod val="120000"/>
-                      </a:schemeClr>
-                    </a:gs>
-                  </a:gsLst>
-                  <a:lin ang="5400000"/>
-                </a:gradFill>
+                <a:solidFill>
+                  <a:schemeClr val="bg1"/>
+                </a:solidFill>
                 <a:effectLst>
                   <a:reflection blurRad="12700" stA="50000" endPos="50000" dist="5000" dir="5400000" sy="-100000" rotWithShape="0"/>
                 </a:effectLst>
@@ -6422,43 +6582,9 @@
             </a:r>
             <a:endParaRPr lang="zh-CN" altLang="en-US" sz="8000" b="1" cap="all" dirty="0">
               <a:ln w="0"/>
-              <a:gradFill flip="none">
-                <a:gsLst>
-                  <a:gs pos="0">
-                    <a:schemeClr val="accent1">
-                      <a:tint val="75000"/>
-                      <a:shade val="75000"/>
-                      <a:satMod val="170000"/>
-                    </a:schemeClr>
-                  </a:gs>
-                  <a:gs pos="49000">
-                    <a:schemeClr val="accent1">
-                      <a:tint val="88000"/>
-                      <a:shade val="65000"/>
-                      <a:satMod val="172000"/>
-                    </a:schemeClr>
-                  </a:gs>
-                  <a:gs pos="50000">
-                    <a:schemeClr val="accent1">
-                      <a:shade val="65000"/>
-                      <a:satMod val="130000"/>
-                    </a:schemeClr>
-                  </a:gs>
-                  <a:gs pos="92000">
-                    <a:schemeClr val="accent1">
-                      <a:shade val="50000"/>
-                      <a:satMod val="120000"/>
-                    </a:schemeClr>
-                  </a:gs>
-                  <a:gs pos="100000">
-                    <a:schemeClr val="accent1">
-                      <a:shade val="48000"/>
-                      <a:satMod val="120000"/>
-                    </a:schemeClr>
-                  </a:gs>
-                </a:gsLst>
-                <a:lin ang="5400000"/>
-              </a:gradFill>
+              <a:solidFill>
+                <a:schemeClr val="bg1"/>
+              </a:solidFill>
               <a:effectLst>
                 <a:reflection blurRad="12700" stA="50000" endPos="50000" dist="5000" dir="5400000" sy="-100000" rotWithShape="0"/>
               </a:effectLst>
@@ -6479,7 +6605,7 @@
   <p:timing>
     <p:tnLst>
       <p:par>
-        <p:cTn id="1" dur="indefinite" restart="never" nodeType="tmRoot"/>
+        <p:cTn xmlns:p14="http://schemas.microsoft.com/office/powerpoint/2010/main" id="1" dur="indefinite" restart="never" nodeType="tmRoot"/>
       </p:par>
     </p:tnLst>
   </p:timing>

</xml_diff>